<commit_message>
Pp til visningen af multiple choice
</commit_message>
<xml_diff>
--- a/Powerpoint multiple choice visning.pptx
+++ b/Powerpoint multiple choice visning.pptx
@@ -104,7 +104,129 @@
       </a:defRPr>
     </a:lvl9pPr>
   </p:defaultTextStyle>
+  <p:extLst>
+    <p:ext uri="{EFAFB233-063F-42B5-8137-9DF3F51BA10A}">
+      <p15:sldGuideLst xmlns:p15="http://schemas.microsoft.com/office/powerpoint/2012/main"/>
+    </p:ext>
+  </p:extLst>
 </p:presentation>
+</file>
+
+<file path=ppt/revisionInfo.xml><?xml version="1.0" encoding="utf-8"?>
+<p1510:revInfo xmlns:a="http://schemas.openxmlformats.org/drawingml/2006/main" xmlns:r="http://schemas.openxmlformats.org/officeDocument/2006/relationships" xmlns:p1510="http://schemas.microsoft.com/office/powerpoint/2015/10/main">
+  <p1510:revLst>
+    <p1510:client id="{F6D326C4-3904-4A7F-ACF5-669EDBE2430B}" v="6" dt="2022-12-16T21:10:51.940"/>
+  </p1510:revLst>
+</p1510:revInfo>
+</file>
+
+<file path=ppt/changesInfos/changesInfo1.xml><?xml version="1.0" encoding="utf-8"?>
+<pc:chgInfo xmlns:a="http://schemas.openxmlformats.org/drawingml/2006/main" xmlns:r="http://schemas.openxmlformats.org/officeDocument/2006/relationships" xmlns:ac="http://schemas.microsoft.com/office/drawing/2013/main/command" xmlns:pc="http://schemas.microsoft.com/office/powerpoint/2013/main/command">
+  <pc:docChgLst>
+    <pc:chgData name="Cathrine Duedahl-Olesen" userId="0f4ad920445e6980" providerId="LiveId" clId="{F6D326C4-3904-4A7F-ACF5-669EDBE2430B}"/>
+    <pc:docChg chg="undo redo custSel modSld">
+      <pc:chgData name="Cathrine Duedahl-Olesen" userId="0f4ad920445e6980" providerId="LiveId" clId="{F6D326C4-3904-4A7F-ACF5-669EDBE2430B}" dt="2022-12-16T21:30:35.680" v="1568" actId="20577"/>
+      <pc:docMkLst>
+        <pc:docMk/>
+      </pc:docMkLst>
+      <pc:sldChg chg="addSp delSp modSp mod">
+        <pc:chgData name="Cathrine Duedahl-Olesen" userId="0f4ad920445e6980" providerId="LiveId" clId="{F6D326C4-3904-4A7F-ACF5-669EDBE2430B}" dt="2022-12-16T21:30:35.680" v="1568" actId="20577"/>
+        <pc:sldMkLst>
+          <pc:docMk/>
+          <pc:sldMk cId="3930709891" sldId="256"/>
+        </pc:sldMkLst>
+        <pc:spChg chg="add del mod">
+          <ac:chgData name="Cathrine Duedahl-Olesen" userId="0f4ad920445e6980" providerId="LiveId" clId="{F6D326C4-3904-4A7F-ACF5-669EDBE2430B}" dt="2022-12-16T21:10:06.651" v="1362" actId="478"/>
+          <ac:spMkLst>
+            <pc:docMk/>
+            <pc:sldMk cId="3930709891" sldId="256"/>
+            <ac:spMk id="2" creationId="{CC3905BF-6373-B845-EB33-687F08D5F9E5}"/>
+          </ac:spMkLst>
+        </pc:spChg>
+        <pc:spChg chg="add del mod">
+          <ac:chgData name="Cathrine Duedahl-Olesen" userId="0f4ad920445e6980" providerId="LiveId" clId="{F6D326C4-3904-4A7F-ACF5-669EDBE2430B}" dt="2022-12-16T21:10:39.749" v="1372" actId="478"/>
+          <ac:spMkLst>
+            <pc:docMk/>
+            <pc:sldMk cId="3930709891" sldId="256"/>
+            <ac:spMk id="3" creationId="{CBDF6678-F373-81AF-ABA2-8DE3C0D7F050}"/>
+          </ac:spMkLst>
+        </pc:spChg>
+        <pc:spChg chg="add del mod">
+          <ac:chgData name="Cathrine Duedahl-Olesen" userId="0f4ad920445e6980" providerId="LiveId" clId="{F6D326C4-3904-4A7F-ACF5-669EDBE2430B}" dt="2022-12-16T21:10:48.513" v="1374" actId="478"/>
+          <ac:spMkLst>
+            <pc:docMk/>
+            <pc:sldMk cId="3930709891" sldId="256"/>
+            <ac:spMk id="4" creationId="{81BB3A43-57D8-6988-942D-3C9CD53A77AF}"/>
+          </ac:spMkLst>
+        </pc:spChg>
+        <pc:spChg chg="add mod">
+          <ac:chgData name="Cathrine Duedahl-Olesen" userId="0f4ad920445e6980" providerId="LiveId" clId="{F6D326C4-3904-4A7F-ACF5-669EDBE2430B}" dt="2022-12-16T21:19:26.066" v="1540" actId="14861"/>
+          <ac:spMkLst>
+            <pc:docMk/>
+            <pc:sldMk cId="3930709891" sldId="256"/>
+            <ac:spMk id="5" creationId="{BC5EEB1D-DF03-D37A-167E-5EC2C2C3E180}"/>
+          </ac:spMkLst>
+        </pc:spChg>
+        <pc:spChg chg="del">
+          <ac:chgData name="Cathrine Duedahl-Olesen" userId="0f4ad920445e6980" providerId="LiveId" clId="{F6D326C4-3904-4A7F-ACF5-669EDBE2430B}" dt="2022-12-16T21:29:20.269" v="1541" actId="478"/>
+          <ac:spMkLst>
+            <pc:docMk/>
+            <pc:sldMk cId="3930709891" sldId="256"/>
+            <ac:spMk id="6" creationId="{EC38C177-2B50-69E6-6D7F-19C8253C49C8}"/>
+          </ac:spMkLst>
+        </pc:spChg>
+        <pc:spChg chg="add mod">
+          <ac:chgData name="Cathrine Duedahl-Olesen" userId="0f4ad920445e6980" providerId="LiveId" clId="{F6D326C4-3904-4A7F-ACF5-669EDBE2430B}" dt="2022-12-16T21:18:31.312" v="1408" actId="1076"/>
+          <ac:spMkLst>
+            <pc:docMk/>
+            <pc:sldMk cId="3930709891" sldId="256"/>
+            <ac:spMk id="7" creationId="{F10D1B94-2612-8136-B6B2-F39AA5F4FB33}"/>
+          </ac:spMkLst>
+        </pc:spChg>
+        <pc:spChg chg="add mod">
+          <ac:chgData name="Cathrine Duedahl-Olesen" userId="0f4ad920445e6980" providerId="LiveId" clId="{F6D326C4-3904-4A7F-ACF5-669EDBE2430B}" dt="2022-12-16T21:19:06.249" v="1413" actId="1076"/>
+          <ac:spMkLst>
+            <pc:docMk/>
+            <pc:sldMk cId="3930709891" sldId="256"/>
+            <ac:spMk id="8" creationId="{0A7D9063-FBDE-0C3F-4B4E-9A6B96103BB2}"/>
+          </ac:spMkLst>
+        </pc:spChg>
+        <pc:spChg chg="add mod">
+          <ac:chgData name="Cathrine Duedahl-Olesen" userId="0f4ad920445e6980" providerId="LiveId" clId="{F6D326C4-3904-4A7F-ACF5-669EDBE2430B}" dt="2022-12-16T21:19:00.920" v="1412" actId="1076"/>
+          <ac:spMkLst>
+            <pc:docMk/>
+            <pc:sldMk cId="3930709891" sldId="256"/>
+            <ac:spMk id="9" creationId="{E076F5EC-DFB0-A42D-0BE4-DC3D2F0EAA58}"/>
+          </ac:spMkLst>
+        </pc:spChg>
+        <pc:spChg chg="add mod">
+          <ac:chgData name="Cathrine Duedahl-Olesen" userId="0f4ad920445e6980" providerId="LiveId" clId="{F6D326C4-3904-4A7F-ACF5-669EDBE2430B}" dt="2022-12-16T21:30:35.680" v="1568" actId="20577"/>
+          <ac:spMkLst>
+            <pc:docMk/>
+            <pc:sldMk cId="3930709891" sldId="256"/>
+            <ac:spMk id="10" creationId="{9E6C1251-4655-B4B7-F57A-7AA8B1EE8CFE}"/>
+          </ac:spMkLst>
+        </pc:spChg>
+        <pc:spChg chg="del mod">
+          <ac:chgData name="Cathrine Duedahl-Olesen" userId="0f4ad920445e6980" providerId="LiveId" clId="{F6D326C4-3904-4A7F-ACF5-669EDBE2430B}" dt="2022-12-16T21:06:25.758" v="381" actId="478"/>
+          <ac:spMkLst>
+            <pc:docMk/>
+            <pc:sldMk cId="3930709891" sldId="256"/>
+            <ac:spMk id="14" creationId="{DB211364-9548-9D52-68CE-ED9292157138}"/>
+          </ac:spMkLst>
+        </pc:spChg>
+        <pc:picChg chg="del mod">
+          <ac:chgData name="Cathrine Duedahl-Olesen" userId="0f4ad920445e6980" providerId="LiveId" clId="{F6D326C4-3904-4A7F-ACF5-669EDBE2430B}" dt="2022-12-16T21:00:50.177" v="368" actId="478"/>
+          <ac:picMkLst>
+            <pc:docMk/>
+            <pc:sldMk cId="3930709891" sldId="256"/>
+            <ac:picMk id="12" creationId="{CB539D4C-EAE8-A4DA-1FD7-4EFFCC29434A}"/>
+          </ac:picMkLst>
+        </pc:picChg>
+      </pc:sldChg>
+    </pc:docChg>
+  </pc:docChgLst>
+</pc:chgInfo>
 </file>
 
 <file path=ppt/slideLayouts/slideLayout1.xml><?xml version="1.0" encoding="utf-8"?>
@@ -3344,238 +3466,20 @@
       </p:grpSpPr>
       <p:sp>
         <p:nvSpPr>
-          <p:cNvPr id="6" name="TextBox 5">
-            <a:extLst>
-              <a:ext uri="{FF2B5EF4-FFF2-40B4-BE49-F238E27FC236}">
-                <a16:creationId xmlns:a16="http://schemas.microsoft.com/office/drawing/2014/main" id="{EC38C177-2B50-69E6-6D7F-19C8253C49C8}"/>
-              </a:ext>
-            </a:extLst>
-          </p:cNvPr>
-          <p:cNvSpPr txBox="1"/>
+          <p:cNvPr id="5" name="Rectangle 4">
+            <a:extLst>
+              <a:ext uri="{FF2B5EF4-FFF2-40B4-BE49-F238E27FC236}">
+                <a16:creationId xmlns:a16="http://schemas.microsoft.com/office/drawing/2014/main" id="{BC5EEB1D-DF03-D37A-167E-5EC2C2C3E180}"/>
+              </a:ext>
+            </a:extLst>
+          </p:cNvPr>
+          <p:cNvSpPr/>
           <p:nvPr/>
         </p:nvSpPr>
         <p:spPr>
           <a:xfrm>
-            <a:off x="731520" y="396240"/>
-            <a:ext cx="10728960" cy="1200329"/>
-          </a:xfrm>
-          <a:prstGeom prst="rect">
-            <a:avLst/>
-          </a:prstGeom>
-          <a:noFill/>
-        </p:spPr>
-        <p:txBody>
-          <a:bodyPr wrap="square" rtlCol="0">
-            <a:spAutoFit/>
-          </a:bodyPr>
-          <a:lstStyle/>
-          <a:p>
-            <a:pPr algn="ctr"/>
-            <a:r>
-              <a:rPr lang="da-DK" sz="2400" dirty="0"/>
-              <a:t>Spørgsmål </a:t>
-            </a:r>
-            <a:r>
-              <a:rPr lang="da-DK" sz="2400" dirty="0" err="1"/>
-              <a:t>Spørgsmål</a:t>
-            </a:r>
-            <a:r>
-              <a:rPr lang="da-DK" sz="2400" dirty="0"/>
-              <a:t> </a:t>
-            </a:r>
-            <a:r>
-              <a:rPr lang="da-DK" sz="2400" dirty="0" err="1"/>
-              <a:t>Spørgsmål</a:t>
-            </a:r>
-            <a:r>
-              <a:rPr lang="da-DK" sz="2400" dirty="0"/>
-              <a:t> </a:t>
-            </a:r>
-            <a:r>
-              <a:rPr lang="da-DK" sz="2400" dirty="0" err="1"/>
-              <a:t>Spørgsmål</a:t>
-            </a:r>
-            <a:r>
-              <a:rPr lang="da-DK" sz="2400" dirty="0"/>
-              <a:t> </a:t>
-            </a:r>
-            <a:r>
-              <a:rPr lang="da-DK" sz="2400" dirty="0" err="1"/>
-              <a:t>Spørgsmål</a:t>
-            </a:r>
-            <a:r>
-              <a:rPr lang="da-DK" sz="2400" dirty="0"/>
-              <a:t> </a:t>
-            </a:r>
-            <a:r>
-              <a:rPr lang="da-DK" sz="2400" dirty="0" err="1"/>
-              <a:t>Spørgsmål</a:t>
-            </a:r>
-            <a:r>
-              <a:rPr lang="da-DK" sz="2400" dirty="0"/>
-              <a:t> </a:t>
-            </a:r>
-            <a:r>
-              <a:rPr lang="da-DK" sz="2400" dirty="0" err="1"/>
-              <a:t>Spørgsmål</a:t>
-            </a:r>
-            <a:r>
-              <a:rPr lang="da-DK" sz="2400" dirty="0"/>
-              <a:t> </a:t>
-            </a:r>
-            <a:r>
-              <a:rPr lang="da-DK" sz="2400" dirty="0" err="1"/>
-              <a:t>Spørgsmål</a:t>
-            </a:r>
-            <a:r>
-              <a:rPr lang="da-DK" sz="2400" dirty="0"/>
-              <a:t> </a:t>
-            </a:r>
-            <a:r>
-              <a:rPr lang="da-DK" sz="2400" dirty="0" err="1"/>
-              <a:t>Spørgsmål</a:t>
-            </a:r>
-            <a:r>
-              <a:rPr lang="da-DK" sz="2400" dirty="0"/>
-              <a:t> </a:t>
-            </a:r>
-            <a:r>
-              <a:rPr lang="da-DK" sz="2400" dirty="0" err="1"/>
-              <a:t>Spørgsmål</a:t>
-            </a:r>
-            <a:r>
-              <a:rPr lang="da-DK" sz="2400" dirty="0"/>
-              <a:t> </a:t>
-            </a:r>
-            <a:r>
-              <a:rPr lang="da-DK" sz="2400" dirty="0" err="1"/>
-              <a:t>Spørgsmål</a:t>
-            </a:r>
-            <a:r>
-              <a:rPr lang="da-DK" sz="2400" dirty="0"/>
-              <a:t> </a:t>
-            </a:r>
-            <a:r>
-              <a:rPr lang="da-DK" sz="2400" dirty="0" err="1"/>
-              <a:t>Spørgsmål</a:t>
-            </a:r>
-            <a:r>
-              <a:rPr lang="da-DK" sz="2400" dirty="0"/>
-              <a:t>  </a:t>
-            </a:r>
-            <a:r>
-              <a:rPr lang="da-DK" sz="2400" dirty="0" err="1"/>
-              <a:t>Spørgsmål</a:t>
-            </a:r>
-            <a:r>
-              <a:rPr lang="da-DK" sz="2400" dirty="0"/>
-              <a:t> </a:t>
-            </a:r>
-            <a:r>
-              <a:rPr lang="da-DK" sz="2400" dirty="0" err="1"/>
-              <a:t>Spørgsmål</a:t>
-            </a:r>
-            <a:r>
-              <a:rPr lang="da-DK" sz="2400" dirty="0"/>
-              <a:t> </a:t>
-            </a:r>
-            <a:r>
-              <a:rPr lang="da-DK" sz="2400" dirty="0" err="1"/>
-              <a:t>Spørgsmål</a:t>
-            </a:r>
-            <a:r>
-              <a:rPr lang="da-DK" sz="2400" dirty="0"/>
-              <a:t> </a:t>
-            </a:r>
-            <a:r>
-              <a:rPr lang="da-DK" sz="2400" dirty="0" err="1"/>
-              <a:t>Spørgsmål</a:t>
-            </a:r>
-            <a:r>
-              <a:rPr lang="da-DK" sz="2400" dirty="0"/>
-              <a:t> </a:t>
-            </a:r>
-            <a:r>
-              <a:rPr lang="da-DK" sz="2400" dirty="0" err="1"/>
-              <a:t>Spørgsmål</a:t>
-            </a:r>
-            <a:r>
-              <a:rPr lang="da-DK" sz="2400" dirty="0"/>
-              <a:t> </a:t>
-            </a:r>
-            <a:r>
-              <a:rPr lang="da-DK" sz="2400" dirty="0" err="1"/>
-              <a:t>Spørgsmål</a:t>
-            </a:r>
-            <a:r>
-              <a:rPr lang="da-DK" sz="2400" dirty="0"/>
-              <a:t> </a:t>
-            </a:r>
-            <a:r>
-              <a:rPr lang="da-DK" sz="2400" dirty="0" err="1"/>
-              <a:t>Spørgsmål</a:t>
-            </a:r>
-            <a:r>
-              <a:rPr lang="da-DK" sz="2400" dirty="0"/>
-              <a:t> </a:t>
-            </a:r>
-            <a:r>
-              <a:rPr lang="da-DK" sz="2400" dirty="0" err="1"/>
-              <a:t>Spørgsmål</a:t>
-            </a:r>
-            <a:r>
-              <a:rPr lang="da-DK" sz="2400" dirty="0"/>
-              <a:t> </a:t>
-            </a:r>
-          </a:p>
-        </p:txBody>
-      </p:sp>
-      <p:pic>
-        <p:nvPicPr>
-          <p:cNvPr id="12" name="Picture 11">
-            <a:extLst>
-              <a:ext uri="{FF2B5EF4-FFF2-40B4-BE49-F238E27FC236}">
-                <a16:creationId xmlns:a16="http://schemas.microsoft.com/office/drawing/2014/main" id="{CB539D4C-EAE8-A4DA-1FD7-4EFFCC29434A}"/>
-              </a:ext>
-            </a:extLst>
-          </p:cNvPr>
-          <p:cNvPicPr>
-            <a:picLocks noChangeAspect="1"/>
-          </p:cNvPicPr>
-          <p:nvPr/>
-        </p:nvPicPr>
-        <p:blipFill>
-          <a:blip r:embed="rId2"/>
-          <a:stretch>
-            <a:fillRect/>
-          </a:stretch>
-        </p:blipFill>
-        <p:spPr>
-          <a:xfrm>
-            <a:off x="7061447" y="3567157"/>
-            <a:ext cx="5130553" cy="2894603"/>
-          </a:xfrm>
-          <a:prstGeom prst="rect">
-            <a:avLst/>
-          </a:prstGeom>
-        </p:spPr>
-      </p:pic>
-      <p:sp>
-        <p:nvSpPr>
-          <p:cNvPr id="14" name="TextBox 13">
-            <a:extLst>
-              <a:ext uri="{FF2B5EF4-FFF2-40B4-BE49-F238E27FC236}">
-                <a16:creationId xmlns:a16="http://schemas.microsoft.com/office/drawing/2014/main" id="{DB211364-9548-9D52-68CE-ED9292157138}"/>
-              </a:ext>
-            </a:extLst>
-          </p:cNvPr>
-          <p:cNvSpPr txBox="1"/>
-          <p:nvPr/>
-        </p:nvSpPr>
-        <p:spPr>
-          <a:xfrm>
-            <a:off x="955040" y="2113280"/>
-            <a:ext cx="4734560" cy="2031325"/>
+            <a:off x="264000" y="1786990"/>
+            <a:ext cx="5760000" cy="2340000"/>
           </a:xfrm>
           <a:prstGeom prst="rect">
             <a:avLst/>
@@ -3583,37 +3487,279 @@
           <a:solidFill>
             <a:srgbClr val="FF0000"/>
           </a:solidFill>
+          <a:ln>
+            <a:noFill/>
+          </a:ln>
+          <a:effectLst>
+            <a:softEdge rad="0"/>
+          </a:effectLst>
         </p:spPr>
-        <p:txBody>
-          <a:bodyPr wrap="square" rtlCol="0">
-            <a:spAutoFit/>
-          </a:bodyPr>
-          <a:lstStyle/>
-          <a:p>
-            <a:r>
-              <a:rPr lang="da-DK" dirty="0"/>
-              <a:t>A.</a:t>
-            </a:r>
-          </a:p>
-          <a:p>
-            <a:endParaRPr lang="da-DK" dirty="0"/>
-          </a:p>
-          <a:p>
-            <a:endParaRPr lang="da-DK" dirty="0"/>
-          </a:p>
-          <a:p>
-            <a:endParaRPr lang="da-DK" dirty="0"/>
-          </a:p>
-          <a:p>
-            <a:endParaRPr lang="da-DK" dirty="0"/>
-          </a:p>
-          <a:p>
-            <a:endParaRPr lang="da-DK" dirty="0"/>
-          </a:p>
-          <a:p>
-            <a:r>
-              <a:rPr lang="da-DK" dirty="0"/>
-              <a:t> </a:t>
+        <p:style>
+          <a:lnRef idx="2">
+            <a:schemeClr val="accent1">
+              <a:shade val="50000"/>
+            </a:schemeClr>
+          </a:lnRef>
+          <a:fillRef idx="1">
+            <a:schemeClr val="accent1"/>
+          </a:fillRef>
+          <a:effectRef idx="0">
+            <a:schemeClr val="accent1"/>
+          </a:effectRef>
+          <a:fontRef idx="minor">
+            <a:schemeClr val="lt1"/>
+          </a:fontRef>
+        </p:style>
+        <p:txBody>
+          <a:bodyPr rtlCol="0" anchor="ctr"/>
+          <a:lstStyle/>
+          <a:p>
+            <a:pPr algn="ctr"/>
+            <a:r>
+              <a:rPr lang="da-DK" dirty="0">
+                <a:solidFill>
+                  <a:schemeClr val="tx1"/>
+                </a:solidFill>
+              </a:rPr>
+              <a:t>A</a:t>
+            </a:r>
+          </a:p>
+        </p:txBody>
+      </p:sp>
+      <p:sp>
+        <p:nvSpPr>
+          <p:cNvPr id="7" name="Rectangle 6">
+            <a:extLst>
+              <a:ext uri="{FF2B5EF4-FFF2-40B4-BE49-F238E27FC236}">
+                <a16:creationId xmlns:a16="http://schemas.microsoft.com/office/drawing/2014/main" id="{F10D1B94-2612-8136-B6B2-F39AA5F4FB33}"/>
+              </a:ext>
+            </a:extLst>
+          </p:cNvPr>
+          <p:cNvSpPr/>
+          <p:nvPr/>
+        </p:nvSpPr>
+        <p:spPr>
+          <a:xfrm>
+            <a:off x="6168002" y="1786990"/>
+            <a:ext cx="5760000" cy="2340000"/>
+          </a:xfrm>
+          <a:prstGeom prst="rect">
+            <a:avLst/>
+          </a:prstGeom>
+          <a:solidFill>
+            <a:srgbClr val="33AF33"/>
+          </a:solidFill>
+          <a:ln>
+            <a:noFill/>
+          </a:ln>
+        </p:spPr>
+        <p:style>
+          <a:lnRef idx="2">
+            <a:schemeClr val="accent1">
+              <a:shade val="50000"/>
+            </a:schemeClr>
+          </a:lnRef>
+          <a:fillRef idx="1">
+            <a:schemeClr val="accent1"/>
+          </a:fillRef>
+          <a:effectRef idx="0">
+            <a:schemeClr val="accent1"/>
+          </a:effectRef>
+          <a:fontRef idx="minor">
+            <a:schemeClr val="lt1"/>
+          </a:fontRef>
+        </p:style>
+        <p:txBody>
+          <a:bodyPr rtlCol="0" anchor="ctr"/>
+          <a:lstStyle/>
+          <a:p>
+            <a:pPr algn="ctr"/>
+            <a:r>
+              <a:rPr lang="da-DK" dirty="0">
+                <a:solidFill>
+                  <a:schemeClr val="tx1"/>
+                </a:solidFill>
+              </a:rPr>
+              <a:t>B</a:t>
+            </a:r>
+          </a:p>
+        </p:txBody>
+      </p:sp>
+      <p:sp>
+        <p:nvSpPr>
+          <p:cNvPr id="8" name="Rectangle 7">
+            <a:extLst>
+              <a:ext uri="{FF2B5EF4-FFF2-40B4-BE49-F238E27FC236}">
+                <a16:creationId xmlns:a16="http://schemas.microsoft.com/office/drawing/2014/main" id="{0A7D9063-FBDE-0C3F-4B4E-9A6B96103BB2}"/>
+              </a:ext>
+            </a:extLst>
+          </p:cNvPr>
+          <p:cNvSpPr/>
+          <p:nvPr/>
+        </p:nvSpPr>
+        <p:spPr>
+          <a:xfrm>
+            <a:off x="264000" y="4269600"/>
+            <a:ext cx="5760000" cy="2340000"/>
+          </a:xfrm>
+          <a:prstGeom prst="rect">
+            <a:avLst/>
+          </a:prstGeom>
+          <a:solidFill>
+            <a:srgbClr val="3333FF"/>
+          </a:solidFill>
+          <a:ln>
+            <a:noFill/>
+          </a:ln>
+        </p:spPr>
+        <p:style>
+          <a:lnRef idx="2">
+            <a:schemeClr val="accent1">
+              <a:shade val="50000"/>
+            </a:schemeClr>
+          </a:lnRef>
+          <a:fillRef idx="1">
+            <a:schemeClr val="accent1"/>
+          </a:fillRef>
+          <a:effectRef idx="0">
+            <a:schemeClr val="accent1"/>
+          </a:effectRef>
+          <a:fontRef idx="minor">
+            <a:schemeClr val="lt1"/>
+          </a:fontRef>
+        </p:style>
+        <p:txBody>
+          <a:bodyPr rtlCol="0" anchor="ctr"/>
+          <a:lstStyle/>
+          <a:p>
+            <a:pPr algn="ctr"/>
+            <a:r>
+              <a:rPr lang="da-DK" dirty="0">
+                <a:solidFill>
+                  <a:schemeClr val="tx1"/>
+                </a:solidFill>
+              </a:rPr>
+              <a:t>C</a:t>
+            </a:r>
+          </a:p>
+        </p:txBody>
+      </p:sp>
+      <p:sp>
+        <p:nvSpPr>
+          <p:cNvPr id="9" name="Rectangle 8">
+            <a:extLst>
+              <a:ext uri="{FF2B5EF4-FFF2-40B4-BE49-F238E27FC236}">
+                <a16:creationId xmlns:a16="http://schemas.microsoft.com/office/drawing/2014/main" id="{E076F5EC-DFB0-A42D-0BE4-DC3D2F0EAA58}"/>
+              </a:ext>
+            </a:extLst>
+          </p:cNvPr>
+          <p:cNvSpPr/>
+          <p:nvPr/>
+        </p:nvSpPr>
+        <p:spPr>
+          <a:xfrm>
+            <a:off x="6168000" y="4269600"/>
+            <a:ext cx="5760000" cy="2340000"/>
+          </a:xfrm>
+          <a:prstGeom prst="rect">
+            <a:avLst/>
+          </a:prstGeom>
+          <a:solidFill>
+            <a:srgbClr val="FFFF33"/>
+          </a:solidFill>
+          <a:ln>
+            <a:noFill/>
+          </a:ln>
+        </p:spPr>
+        <p:style>
+          <a:lnRef idx="2">
+            <a:schemeClr val="accent1">
+              <a:shade val="50000"/>
+            </a:schemeClr>
+          </a:lnRef>
+          <a:fillRef idx="1">
+            <a:schemeClr val="accent1"/>
+          </a:fillRef>
+          <a:effectRef idx="0">
+            <a:schemeClr val="accent1"/>
+          </a:effectRef>
+          <a:fontRef idx="minor">
+            <a:schemeClr val="lt1"/>
+          </a:fontRef>
+        </p:style>
+        <p:txBody>
+          <a:bodyPr rtlCol="0" anchor="ctr"/>
+          <a:lstStyle/>
+          <a:p>
+            <a:pPr algn="ctr"/>
+            <a:r>
+              <a:rPr lang="da-DK" dirty="0">
+                <a:solidFill>
+                  <a:schemeClr val="tx1"/>
+                </a:solidFill>
+              </a:rPr>
+              <a:t>A</a:t>
+            </a:r>
+          </a:p>
+        </p:txBody>
+      </p:sp>
+      <p:sp>
+        <p:nvSpPr>
+          <p:cNvPr id="10" name="Rectangle 9">
+            <a:extLst>
+              <a:ext uri="{FF2B5EF4-FFF2-40B4-BE49-F238E27FC236}">
+                <a16:creationId xmlns:a16="http://schemas.microsoft.com/office/drawing/2014/main" id="{9E6C1251-4655-B4B7-F57A-7AA8B1EE8CFE}"/>
+              </a:ext>
+            </a:extLst>
+          </p:cNvPr>
+          <p:cNvSpPr/>
+          <p:nvPr/>
+        </p:nvSpPr>
+        <p:spPr>
+          <a:xfrm>
+            <a:off x="264000" y="274320"/>
+            <a:ext cx="11664000" cy="1370060"/>
+          </a:xfrm>
+          <a:prstGeom prst="rect">
+            <a:avLst/>
+          </a:prstGeom>
+          <a:solidFill>
+            <a:schemeClr val="bg1"/>
+          </a:solidFill>
+          <a:ln>
+            <a:solidFill>
+              <a:schemeClr val="bg1"/>
+            </a:solidFill>
+          </a:ln>
+        </p:spPr>
+        <p:style>
+          <a:lnRef idx="2">
+            <a:schemeClr val="accent1">
+              <a:shade val="50000"/>
+            </a:schemeClr>
+          </a:lnRef>
+          <a:fillRef idx="1">
+            <a:schemeClr val="accent1"/>
+          </a:fillRef>
+          <a:effectRef idx="0">
+            <a:schemeClr val="accent1"/>
+          </a:effectRef>
+          <a:fontRef idx="minor">
+            <a:schemeClr val="lt1"/>
+          </a:fontRef>
+        </p:style>
+        <p:txBody>
+          <a:bodyPr rtlCol="0" anchor="ctr"/>
+          <a:lstStyle/>
+          <a:p>
+            <a:pPr algn="ctr"/>
+            <a:r>
+              <a:rPr lang="da-DK" dirty="0">
+                <a:solidFill>
+                  <a:schemeClr val="tx1"/>
+                </a:solidFill>
+              </a:rPr>
+              <a:t>Spørgsmål</a:t>
             </a:r>
           </a:p>
         </p:txBody>

</xml_diff>

<commit_message>
Placering af svar boxe
</commit_message>
<xml_diff>
--- a/Powerpoint multiple choice visning.pptx
+++ b/Powerpoint multiple choice visning.pptx
@@ -125,12 +125,12 @@
   <pc:docChgLst>
     <pc:chgData name="Cathrine Duedahl-Olesen" userId="0f4ad920445e6980" providerId="LiveId" clId="{F6D326C4-3904-4A7F-ACF5-669EDBE2430B}"/>
     <pc:docChg chg="undo redo custSel modSld">
-      <pc:chgData name="Cathrine Duedahl-Olesen" userId="0f4ad920445e6980" providerId="LiveId" clId="{F6D326C4-3904-4A7F-ACF5-669EDBE2430B}" dt="2022-12-16T21:30:35.680" v="1568" actId="20577"/>
+      <pc:chgData name="Cathrine Duedahl-Olesen" userId="0f4ad920445e6980" providerId="LiveId" clId="{F6D326C4-3904-4A7F-ACF5-669EDBE2430B}" dt="2022-12-19T12:04:07.794" v="1571" actId="1076"/>
       <pc:docMkLst>
         <pc:docMk/>
       </pc:docMkLst>
       <pc:sldChg chg="addSp delSp modSp mod">
-        <pc:chgData name="Cathrine Duedahl-Olesen" userId="0f4ad920445e6980" providerId="LiveId" clId="{F6D326C4-3904-4A7F-ACF5-669EDBE2430B}" dt="2022-12-16T21:30:35.680" v="1568" actId="20577"/>
+        <pc:chgData name="Cathrine Duedahl-Olesen" userId="0f4ad920445e6980" providerId="LiveId" clId="{F6D326C4-3904-4A7F-ACF5-669EDBE2430B}" dt="2022-12-19T12:04:07.794" v="1571" actId="1076"/>
         <pc:sldMkLst>
           <pc:docMk/>
           <pc:sldMk cId="3930709891" sldId="256"/>
@@ -160,7 +160,7 @@
           </ac:spMkLst>
         </pc:spChg>
         <pc:spChg chg="add mod">
-          <ac:chgData name="Cathrine Duedahl-Olesen" userId="0f4ad920445e6980" providerId="LiveId" clId="{F6D326C4-3904-4A7F-ACF5-669EDBE2430B}" dt="2022-12-16T21:19:26.066" v="1540" actId="14861"/>
+          <ac:chgData name="Cathrine Duedahl-Olesen" userId="0f4ad920445e6980" providerId="LiveId" clId="{F6D326C4-3904-4A7F-ACF5-669EDBE2430B}" dt="2022-12-19T11:52:29.340" v="1570" actId="1076"/>
           <ac:spMkLst>
             <pc:docMk/>
             <pc:sldMk cId="3930709891" sldId="256"/>
@@ -200,7 +200,7 @@
           </ac:spMkLst>
         </pc:spChg>
         <pc:spChg chg="add mod">
-          <ac:chgData name="Cathrine Duedahl-Olesen" userId="0f4ad920445e6980" providerId="LiveId" clId="{F6D326C4-3904-4A7F-ACF5-669EDBE2430B}" dt="2022-12-16T21:30:35.680" v="1568" actId="20577"/>
+          <ac:chgData name="Cathrine Duedahl-Olesen" userId="0f4ad920445e6980" providerId="LiveId" clId="{F6D326C4-3904-4A7F-ACF5-669EDBE2430B}" dt="2022-12-19T12:04:07.794" v="1571" actId="1076"/>
           <ac:spMkLst>
             <pc:docMk/>
             <pc:sldMk cId="3930709891" sldId="256"/>
@@ -378,7 +378,7 @@
           <a:p>
             <a:fld id="{A370B74F-658C-4238-8373-150AA6184CF9}" type="datetimeFigureOut">
               <a:rPr lang="da-DK" smtClean="0"/>
-              <a:t>16-12-2022</a:t>
+              <a:t>19-12-2022</a:t>
             </a:fld>
             <a:endParaRPr lang="da-DK"/>
           </a:p>
@@ -578,7 +578,7 @@
           <a:p>
             <a:fld id="{A370B74F-658C-4238-8373-150AA6184CF9}" type="datetimeFigureOut">
               <a:rPr lang="da-DK" smtClean="0"/>
-              <a:t>16-12-2022</a:t>
+              <a:t>19-12-2022</a:t>
             </a:fld>
             <a:endParaRPr lang="da-DK"/>
           </a:p>
@@ -788,7 +788,7 @@
           <a:p>
             <a:fld id="{A370B74F-658C-4238-8373-150AA6184CF9}" type="datetimeFigureOut">
               <a:rPr lang="da-DK" smtClean="0"/>
-              <a:t>16-12-2022</a:t>
+              <a:t>19-12-2022</a:t>
             </a:fld>
             <a:endParaRPr lang="da-DK"/>
           </a:p>
@@ -988,7 +988,7 @@
           <a:p>
             <a:fld id="{A370B74F-658C-4238-8373-150AA6184CF9}" type="datetimeFigureOut">
               <a:rPr lang="da-DK" smtClean="0"/>
-              <a:t>16-12-2022</a:t>
+              <a:t>19-12-2022</a:t>
             </a:fld>
             <a:endParaRPr lang="da-DK"/>
           </a:p>
@@ -1264,7 +1264,7 @@
           <a:p>
             <a:fld id="{A370B74F-658C-4238-8373-150AA6184CF9}" type="datetimeFigureOut">
               <a:rPr lang="da-DK" smtClean="0"/>
-              <a:t>16-12-2022</a:t>
+              <a:t>19-12-2022</a:t>
             </a:fld>
             <a:endParaRPr lang="da-DK"/>
           </a:p>
@@ -1532,7 +1532,7 @@
           <a:p>
             <a:fld id="{A370B74F-658C-4238-8373-150AA6184CF9}" type="datetimeFigureOut">
               <a:rPr lang="da-DK" smtClean="0"/>
-              <a:t>16-12-2022</a:t>
+              <a:t>19-12-2022</a:t>
             </a:fld>
             <a:endParaRPr lang="da-DK"/>
           </a:p>
@@ -1947,7 +1947,7 @@
           <a:p>
             <a:fld id="{A370B74F-658C-4238-8373-150AA6184CF9}" type="datetimeFigureOut">
               <a:rPr lang="da-DK" smtClean="0"/>
-              <a:t>16-12-2022</a:t>
+              <a:t>19-12-2022</a:t>
             </a:fld>
             <a:endParaRPr lang="da-DK"/>
           </a:p>
@@ -2089,7 +2089,7 @@
           <a:p>
             <a:fld id="{A370B74F-658C-4238-8373-150AA6184CF9}" type="datetimeFigureOut">
               <a:rPr lang="da-DK" smtClean="0"/>
-              <a:t>16-12-2022</a:t>
+              <a:t>19-12-2022</a:t>
             </a:fld>
             <a:endParaRPr lang="da-DK"/>
           </a:p>
@@ -2202,7 +2202,7 @@
           <a:p>
             <a:fld id="{A370B74F-658C-4238-8373-150AA6184CF9}" type="datetimeFigureOut">
               <a:rPr lang="da-DK" smtClean="0"/>
-              <a:t>16-12-2022</a:t>
+              <a:t>19-12-2022</a:t>
             </a:fld>
             <a:endParaRPr lang="da-DK"/>
           </a:p>
@@ -2515,7 +2515,7 @@
           <a:p>
             <a:fld id="{A370B74F-658C-4238-8373-150AA6184CF9}" type="datetimeFigureOut">
               <a:rPr lang="da-DK" smtClean="0"/>
-              <a:t>16-12-2022</a:t>
+              <a:t>19-12-2022</a:t>
             </a:fld>
             <a:endParaRPr lang="da-DK"/>
           </a:p>
@@ -2804,7 +2804,7 @@
           <a:p>
             <a:fld id="{A370B74F-658C-4238-8373-150AA6184CF9}" type="datetimeFigureOut">
               <a:rPr lang="da-DK" smtClean="0"/>
-              <a:t>16-12-2022</a:t>
+              <a:t>19-12-2022</a:t>
             </a:fld>
             <a:endParaRPr lang="da-DK"/>
           </a:p>
@@ -3047,7 +3047,7 @@
           <a:p>
             <a:fld id="{A370B74F-658C-4238-8373-150AA6184CF9}" type="datetimeFigureOut">
               <a:rPr lang="da-DK" smtClean="0"/>
-              <a:t>16-12-2022</a:t>
+              <a:t>19-12-2022</a:t>
             </a:fld>
             <a:endParaRPr lang="da-DK"/>
           </a:p>
@@ -3478,7 +3478,7 @@
         </p:nvSpPr>
         <p:spPr>
           <a:xfrm>
-            <a:off x="264000" y="1786990"/>
+            <a:off x="264000" y="1837790"/>
             <a:ext cx="5760000" cy="2340000"/>
           </a:xfrm>
           <a:prstGeom prst="rect">
@@ -3717,7 +3717,7 @@
         </p:nvSpPr>
         <p:spPr>
           <a:xfrm>
-            <a:off x="264000" y="274320"/>
+            <a:off x="264000" y="172720"/>
             <a:ext cx="11664000" cy="1370060"/>
           </a:xfrm>
           <a:prstGeom prst="rect">

</xml_diff>